<commit_message>
feat: Material de Apoio FOCA Linux + Análise Completa
- Análise completa de 757 arquivos FOCA Linux
- Identificação de conteúdo prioritário por módulo
- Material de apoio criado para todos os módulos
- Módulo 5 (Segurança) e 6 (Observabilidade) reforçados
- Interface de Material de Apoio com busca e filtros
- CSS específico para material de apoio
- Integração automática de conteúdo relevante
- Navegação atualizada com link para Material de Apoio
</commit_message>
<xml_diff>
--- a/Administracao de Sistemas GNU-LinuxFundamentos e Pratica/Semestre 1/FIAP - Linux 01 - Conceitos.pptx
+++ b/Administracao de Sistemas GNU-LinuxFundamentos e Pratica/Semestre 1/FIAP - Linux 01 - Conceitos.pptx
@@ -4446,7 +4446,7 @@
           <a:p>
             <a:r>
               <a:rPr lang="pt-BR" dirty="0"/>
-              <a:t>Guilherme Rodrigues</a:t>
+              <a:t>Antonio Figueiredo</a:t>
             </a:r>
           </a:p>
         </p:txBody>
@@ -6707,10 +6707,41 @@
         </p:nvSpPr>
         <p:spPr/>
         <p:txBody>
-          <a:bodyPr/>
+          <a:bodyPr>
+            <a:normAutofit fontScale="92500"/>
+          </a:bodyPr>
           <a:lstStyle/>
           <a:p>
-            <a:endParaRPr lang="pt-BR"/>
+            <a:r>
+              <a:rPr lang="pt-BR" dirty="0"/>
+              <a:t>Vamos Seguir o material adicional instalando duas </a:t>
+            </a:r>
+            <a:r>
+              <a:rPr lang="pt-BR" dirty="0" err="1"/>
+              <a:t>VMs</a:t>
+            </a:r>
+            <a:r>
+              <a:rPr lang="pt-BR" dirty="0"/>
+              <a:t> na Azure</a:t>
+            </a:r>
+            <a:br>
+              <a:rPr lang="pt-BR" dirty="0"/>
+            </a:br>
+            <a:r>
+              <a:rPr lang="pt-BR" dirty="0"/>
+              <a:t>- Uma VM com Windows 11 + WSL + </a:t>
+            </a:r>
+            <a:r>
+              <a:rPr lang="pt-BR" dirty="0" err="1"/>
+              <a:t>VSCode</a:t>
+            </a:r>
+            <a:endParaRPr lang="pt-BR" dirty="0"/>
+          </a:p>
+          <a:p>
+            <a:r>
+              <a:rPr lang="pt-BR" dirty="0"/>
+              <a:t>- Uma VM Linux Ubuntu </a:t>
+            </a:r>
           </a:p>
         </p:txBody>
       </p:sp>

</xml_diff>